<commit_message>
Add screen shot of the mock-up to Slide
</commit_message>
<xml_diff>
--- a/TestBuilders.pptx
+++ b/TestBuilders.pptx
@@ -113,7 +113,7 @@
   </p:defaultTextStyle>
   <p:extLst>
     <p:ext uri="{EFAFB233-063F-42B5-8137-9DF3F51BA10A}">
-      <p15:sldGuideLst xmlns:p15="http://schemas.microsoft.com/office/powerpoint/2012/main"/>
+      <p15:sldGuideLst xmlns="" xmlns:p15="http://schemas.microsoft.com/office/powerpoint/2012/main"/>
     </p:ext>
   </p:extLst>
 </p:presentation>
@@ -842,7 +842,7 @@
             <a:fld id="{B61BEF0D-F0BB-DE4B-95CE-6DB70DBA9567}" type="datetimeFigureOut">
               <a:rPr lang="en-US" dirty="0"/>
               <a:pPr/>
-              <a:t>2/8/2014</a:t>
+              <a:t>2/9/2014</a:t>
             </a:fld>
             <a:endParaRPr lang="en-US" dirty="0"/>
           </a:p>
@@ -1090,7 +1090,7 @@
             <a:fld id="{B61BEF0D-F0BB-DE4B-95CE-6DB70DBA9567}" type="datetimeFigureOut">
               <a:rPr lang="en-US" dirty="0"/>
               <a:pPr/>
-              <a:t>2/8/2014</a:t>
+              <a:t>2/9/2014</a:t>
             </a:fld>
             <a:endParaRPr lang="en-US" dirty="0"/>
           </a:p>
@@ -1401,7 +1401,7 @@
             <a:fld id="{B61BEF0D-F0BB-DE4B-95CE-6DB70DBA9567}" type="datetimeFigureOut">
               <a:rPr lang="en-US" dirty="0"/>
               <a:pPr/>
-              <a:t>2/8/2014</a:t>
+              <a:t>2/9/2014</a:t>
             </a:fld>
             <a:endParaRPr lang="en-US" dirty="0"/>
           </a:p>
@@ -1739,7 +1739,7 @@
             <a:fld id="{B61BEF0D-F0BB-DE4B-95CE-6DB70DBA9567}" type="datetimeFigureOut">
               <a:rPr lang="en-US" dirty="0"/>
               <a:pPr/>
-              <a:t>2/8/2014</a:t>
+              <a:t>2/9/2014</a:t>
             </a:fld>
             <a:endParaRPr lang="en-US" dirty="0"/>
           </a:p>
@@ -2050,7 +2050,7 @@
             <a:fld id="{B61BEF0D-F0BB-DE4B-95CE-6DB70DBA9567}" type="datetimeFigureOut">
               <a:rPr lang="en-US" dirty="0"/>
               <a:pPr/>
-              <a:t>2/8/2014</a:t>
+              <a:t>2/9/2014</a:t>
             </a:fld>
             <a:endParaRPr lang="en-US" dirty="0"/>
           </a:p>
@@ -2440,7 +2440,7 @@
             <a:fld id="{B61BEF0D-F0BB-DE4B-95CE-6DB70DBA9567}" type="datetimeFigureOut">
               <a:rPr lang="en-US" dirty="0"/>
               <a:pPr/>
-              <a:t>2/8/2014</a:t>
+              <a:t>2/9/2014</a:t>
             </a:fld>
             <a:endParaRPr lang="en-US" dirty="0"/>
           </a:p>
@@ -2606,7 +2606,7 @@
           <a:p>
             <a:fld id="{55C6B4A9-1611-4792-9094-5F34BCA07E0B}" type="datetimeFigureOut">
               <a:rPr lang="en-US" dirty="0"/>
-              <a:t>2/8/2014</a:t>
+              <a:t>2/9/2014</a:t>
             </a:fld>
             <a:endParaRPr lang="en-US" dirty="0"/>
           </a:p>
@@ -2782,7 +2782,7 @@
             <a:fld id="{B61BEF0D-F0BB-DE4B-95CE-6DB70DBA9567}" type="datetimeFigureOut">
               <a:rPr lang="en-US" dirty="0"/>
               <a:pPr/>
-              <a:t>2/8/2014</a:t>
+              <a:t>2/9/2014</a:t>
             </a:fld>
             <a:endParaRPr lang="en-US" dirty="0"/>
           </a:p>
@@ -2955,7 +2955,7 @@
             <a:fld id="{B61BEF0D-F0BB-DE4B-95CE-6DB70DBA9567}" type="datetimeFigureOut">
               <a:rPr lang="en-US" dirty="0"/>
               <a:pPr/>
-              <a:t>2/8/2014</a:t>
+              <a:t>2/9/2014</a:t>
             </a:fld>
             <a:endParaRPr lang="en-US" dirty="0"/>
           </a:p>
@@ -3199,7 +3199,7 @@
             <a:fld id="{B61BEF0D-F0BB-DE4B-95CE-6DB70DBA9567}" type="datetimeFigureOut">
               <a:rPr lang="en-US" dirty="0"/>
               <a:pPr/>
-              <a:t>2/8/2014</a:t>
+              <a:t>2/9/2014</a:t>
             </a:fld>
             <a:endParaRPr lang="en-US" dirty="0"/>
           </a:p>
@@ -3427,7 +3427,7 @@
           <a:p>
             <a:fld id="{EB712588-04B1-427B-82EE-E8DB90309F08}" type="datetimeFigureOut">
               <a:rPr lang="en-US" dirty="0"/>
-              <a:t>2/8/2014</a:t>
+              <a:t>2/9/2014</a:t>
             </a:fld>
             <a:endParaRPr lang="en-US" dirty="0"/>
           </a:p>
@@ -3797,7 +3797,7 @@
             <a:fld id="{B61BEF0D-F0BB-DE4B-95CE-6DB70DBA9567}" type="datetimeFigureOut">
               <a:rPr lang="en-US" dirty="0"/>
               <a:pPr/>
-              <a:t>2/8/2014</a:t>
+              <a:t>2/9/2014</a:t>
             </a:fld>
             <a:endParaRPr lang="en-US" dirty="0"/>
           </a:p>
@@ -3917,7 +3917,7 @@
             <a:fld id="{B61BEF0D-F0BB-DE4B-95CE-6DB70DBA9567}" type="datetimeFigureOut">
               <a:rPr lang="en-US" dirty="0"/>
               <a:pPr/>
-              <a:t>2/8/2014</a:t>
+              <a:t>2/9/2014</a:t>
             </a:fld>
             <a:endParaRPr lang="en-US" dirty="0"/>
           </a:p>
@@ -4009,7 +4009,7 @@
             <a:fld id="{B61BEF0D-F0BB-DE4B-95CE-6DB70DBA9567}" type="datetimeFigureOut">
               <a:rPr lang="en-US" dirty="0"/>
               <a:pPr/>
-              <a:t>2/8/2014</a:t>
+              <a:t>2/9/2014</a:t>
             </a:fld>
             <a:endParaRPr lang="en-US" dirty="0"/>
           </a:p>
@@ -4260,7 +4260,7 @@
           <a:p>
             <a:fld id="{42A54C80-263E-416B-A8E0-580EDEADCBDC}" type="datetimeFigureOut">
               <a:rPr lang="en-US" dirty="0"/>
-              <a:t>2/8/2014</a:t>
+              <a:t>2/9/2014</a:t>
             </a:fld>
             <a:endParaRPr lang="en-US" dirty="0"/>
           </a:p>
@@ -4519,7 +4519,7 @@
             <a:fld id="{B61BEF0D-F0BB-DE4B-95CE-6DB70DBA9567}" type="datetimeFigureOut">
               <a:rPr lang="en-US" dirty="0"/>
               <a:pPr/>
-              <a:t>2/8/2014</a:t>
+              <a:t>2/9/2014</a:t>
             </a:fld>
             <a:endParaRPr lang="en-US" dirty="0"/>
           </a:p>
@@ -5259,7 +5259,7 @@
             <a:fld id="{B61BEF0D-F0BB-DE4B-95CE-6DB70DBA9567}" type="datetimeFigureOut">
               <a:rPr lang="en-US" dirty="0"/>
               <a:pPr/>
-              <a:t>2/8/2014</a:t>
+              <a:t>2/9/2014</a:t>
             </a:fld>
             <a:endParaRPr lang="en-US" dirty="0"/>
           </a:p>
@@ -6653,29 +6653,6 @@
       </p:sp>
       <p:sp>
         <p:nvSpPr>
-          <p:cNvPr id="3" name="Content Placeholder 2"/>
-          <p:cNvSpPr>
-            <a:spLocks noGrp="1"/>
-          </p:cNvSpPr>
-          <p:nvPr>
-            <p:ph idx="1"/>
-          </p:nvPr>
-        </p:nvSpPr>
-        <p:spPr/>
-        <p:txBody>
-          <a:bodyPr/>
-          <a:lstStyle/>
-          <a:p>
-            <a:r>
-              <a:rPr lang="en-US" dirty="0" smtClean="0"/>
-              <a:t>INSERT PICUTRE OF THE MOCK UP SCREEN</a:t>
-            </a:r>
-            <a:endParaRPr lang="en-US" dirty="0"/>
-          </a:p>
-        </p:txBody>
-      </p:sp>
-      <p:sp>
-        <p:nvSpPr>
           <p:cNvPr id="4" name="Text Placeholder 3"/>
           <p:cNvSpPr>
             <a:spLocks noGrp="1"/>
@@ -6684,7 +6661,12 @@
             <p:ph type="body" sz="half" idx="2"/>
           </p:nvPr>
         </p:nvSpPr>
-        <p:spPr/>
+        <p:spPr>
+          <a:xfrm>
+            <a:off x="677334" y="2730321"/>
+            <a:ext cx="3854528" cy="2631197"/>
+          </a:xfrm>
+        </p:spPr>
         <p:txBody>
           <a:bodyPr/>
           <a:lstStyle/>
@@ -6705,6 +6687,60 @@
           </a:p>
         </p:txBody>
       </p:sp>
+      <p:pic>
+        <p:nvPicPr>
+          <p:cNvPr id="1027" name="Picture 3"/>
+          <p:cNvPicPr>
+            <a:picLocks noChangeAspect="1" noChangeArrowheads="1"/>
+          </p:cNvPicPr>
+          <p:nvPr/>
+        </p:nvPicPr>
+        <p:blipFill>
+          <a:blip r:embed="rId2">
+            <a:extLst>
+              <a:ext uri="{28A0092B-C50C-407E-A947-70E740481C1C}">
+                <a14:useLocalDpi xmlns:a14="http://schemas.microsoft.com/office/drawing/2010/main" val="0"/>
+              </a:ext>
+            </a:extLst>
+          </a:blip>
+          <a:srcRect/>
+          <a:stretch>
+            <a:fillRect/>
+          </a:stretch>
+        </p:blipFill>
+        <p:spPr bwMode="auto">
+          <a:xfrm>
+            <a:off x="4328787" y="1686426"/>
+            <a:ext cx="6108190" cy="3722468"/>
+          </a:xfrm>
+          <a:prstGeom prst="rect">
+            <a:avLst/>
+          </a:prstGeom>
+          <a:noFill/>
+          <a:ln>
+            <a:noFill/>
+          </a:ln>
+          <a:extLst>
+            <a:ext uri="{909E8E84-426E-40DD-AFC4-6F175D3DCCD1}">
+              <a14:hiddenFill xmlns:a14="http://schemas.microsoft.com/office/drawing/2010/main">
+                <a:solidFill>
+                  <a:schemeClr val="accent1"/>
+                </a:solidFill>
+              </a14:hiddenFill>
+            </a:ext>
+            <a:ext uri="{91240B29-F687-4F45-9708-019B960494DF}">
+              <a14:hiddenLine xmlns:a14="http://schemas.microsoft.com/office/drawing/2010/main" w="9525">
+                <a:solidFill>
+                  <a:schemeClr val="tx1"/>
+                </a:solidFill>
+                <a:miter lim="800000"/>
+                <a:headEnd/>
+                <a:tailEnd/>
+              </a14:hiddenLine>
+            </a:ext>
+          </a:extLst>
+        </p:spPr>
+      </p:pic>
     </p:spTree>
     <p:extLst>
       <p:ext uri="{BB962C8B-B14F-4D97-AF65-F5344CB8AC3E}">
@@ -6863,15 +6899,7 @@
           <a:p>
             <a:r>
               <a:rPr lang="en-US" dirty="0" smtClean="0"/>
-              <a:t>Successful software program installed on the computer in the </a:t>
-            </a:r>
-            <a:r>
-              <a:rPr lang="en-US" dirty="0" err="1" smtClean="0"/>
-              <a:t>Djepartment</a:t>
-            </a:r>
-            <a:r>
-              <a:rPr lang="en-US" dirty="0" smtClean="0"/>
-              <a:t> of Otolaryngology at OHSU</a:t>
+              <a:t>Successful software program installed on the computer in the Department of Otolaryngology at OHSU</a:t>
             </a:r>
           </a:p>
           <a:p>
@@ -6921,13 +6949,8 @@
           <a:p>
             <a:r>
               <a:rPr lang="en-US" dirty="0" smtClean="0"/>
-              <a:t>Final </a:t>
-            </a:r>
-            <a:r>
-              <a:rPr lang="en-US" smtClean="0"/>
-              <a:t>Project report</a:t>
-            </a:r>
-            <a:endParaRPr lang="en-US" dirty="0" smtClean="0"/>
+              <a:t>Final Project report</a:t>
+            </a:r>
           </a:p>
           <a:p>
             <a:endParaRPr lang="en-US" dirty="0"/>
@@ -7228,7 +7251,7 @@
   <a:extraClrSchemeLst/>
   <a:extLst>
     <a:ext uri="{05A4C25C-085E-4340-85A3-A5531E510DB2}">
-      <thm15:themeFamily xmlns:thm15="http://schemas.microsoft.com/office/thememl/2012/main" name="Facet" id="{C0C680CD-088A-49FC-A102-D699147F32B2}" vid="{CFBC31BA-B70F-4F30-BCAA-4F3011E16C4D}"/>
+      <thm15:themeFamily xmlns="" xmlns:thm15="http://schemas.microsoft.com/office/thememl/2012/main" name="Facet" id="{C0C680CD-088A-49FC-A102-D699147F32B2}" vid="{CFBC31BA-B70F-4F30-BCAA-4F3011E16C4D}"/>
     </a:ext>
   </a:extLst>
 </a:theme>

</xml_diff>

<commit_message>
replacing file that was modified
</commit_message>
<xml_diff>
--- a/TestBuilders.pptx
+++ b/TestBuilders.pptx
@@ -113,7 +113,18 @@
   </p:defaultTextStyle>
   <p:extLst>
     <p:ext uri="{EFAFB233-063F-42B5-8137-9DF3F51BA10A}">
-      <p15:sldGuideLst xmlns="" xmlns:p15="http://schemas.microsoft.com/office/powerpoint/2012/main"/>
+      <p15:sldGuideLst xmlns:p15="http://schemas.microsoft.com/office/powerpoint/2012/main">
+        <p15:guide id="1" orient="horz" pos="2160">
+          <p15:clr>
+            <a:srgbClr val="A4A3A4"/>
+          </p15:clr>
+        </p15:guide>
+        <p15:guide id="2" pos="3840">
+          <p15:clr>
+            <a:srgbClr val="A4A3A4"/>
+          </p15:clr>
+        </p15:guide>
+      </p15:sldGuideLst>
     </p:ext>
   </p:extLst>
 </p:presentation>
@@ -842,7 +853,7 @@
             <a:fld id="{B61BEF0D-F0BB-DE4B-95CE-6DB70DBA9567}" type="datetimeFigureOut">
               <a:rPr lang="en-US" dirty="0"/>
               <a:pPr/>
-              <a:t>2/9/2014</a:t>
+              <a:t>2/12/2014</a:t>
             </a:fld>
             <a:endParaRPr lang="en-US" dirty="0"/>
           </a:p>
@@ -1090,7 +1101,7 @@
             <a:fld id="{B61BEF0D-F0BB-DE4B-95CE-6DB70DBA9567}" type="datetimeFigureOut">
               <a:rPr lang="en-US" dirty="0"/>
               <a:pPr/>
-              <a:t>2/9/2014</a:t>
+              <a:t>2/12/2014</a:t>
             </a:fld>
             <a:endParaRPr lang="en-US" dirty="0"/>
           </a:p>
@@ -1401,7 +1412,7 @@
             <a:fld id="{B61BEF0D-F0BB-DE4B-95CE-6DB70DBA9567}" type="datetimeFigureOut">
               <a:rPr lang="en-US" dirty="0"/>
               <a:pPr/>
-              <a:t>2/9/2014</a:t>
+              <a:t>2/12/2014</a:t>
             </a:fld>
             <a:endParaRPr lang="en-US" dirty="0"/>
           </a:p>
@@ -1739,7 +1750,7 @@
             <a:fld id="{B61BEF0D-F0BB-DE4B-95CE-6DB70DBA9567}" type="datetimeFigureOut">
               <a:rPr lang="en-US" dirty="0"/>
               <a:pPr/>
-              <a:t>2/9/2014</a:t>
+              <a:t>2/12/2014</a:t>
             </a:fld>
             <a:endParaRPr lang="en-US" dirty="0"/>
           </a:p>
@@ -2050,7 +2061,7 @@
             <a:fld id="{B61BEF0D-F0BB-DE4B-95CE-6DB70DBA9567}" type="datetimeFigureOut">
               <a:rPr lang="en-US" dirty="0"/>
               <a:pPr/>
-              <a:t>2/9/2014</a:t>
+              <a:t>2/12/2014</a:t>
             </a:fld>
             <a:endParaRPr lang="en-US" dirty="0"/>
           </a:p>
@@ -2440,7 +2451,7 @@
             <a:fld id="{B61BEF0D-F0BB-DE4B-95CE-6DB70DBA9567}" type="datetimeFigureOut">
               <a:rPr lang="en-US" dirty="0"/>
               <a:pPr/>
-              <a:t>2/9/2014</a:t>
+              <a:t>2/12/2014</a:t>
             </a:fld>
             <a:endParaRPr lang="en-US" dirty="0"/>
           </a:p>
@@ -2606,7 +2617,7 @@
           <a:p>
             <a:fld id="{55C6B4A9-1611-4792-9094-5F34BCA07E0B}" type="datetimeFigureOut">
               <a:rPr lang="en-US" dirty="0"/>
-              <a:t>2/9/2014</a:t>
+              <a:t>2/12/2014</a:t>
             </a:fld>
             <a:endParaRPr lang="en-US" dirty="0"/>
           </a:p>
@@ -2782,7 +2793,7 @@
             <a:fld id="{B61BEF0D-F0BB-DE4B-95CE-6DB70DBA9567}" type="datetimeFigureOut">
               <a:rPr lang="en-US" dirty="0"/>
               <a:pPr/>
-              <a:t>2/9/2014</a:t>
+              <a:t>2/12/2014</a:t>
             </a:fld>
             <a:endParaRPr lang="en-US" dirty="0"/>
           </a:p>
@@ -2955,7 +2966,7 @@
             <a:fld id="{B61BEF0D-F0BB-DE4B-95CE-6DB70DBA9567}" type="datetimeFigureOut">
               <a:rPr lang="en-US" dirty="0"/>
               <a:pPr/>
-              <a:t>2/9/2014</a:t>
+              <a:t>2/12/2014</a:t>
             </a:fld>
             <a:endParaRPr lang="en-US" dirty="0"/>
           </a:p>
@@ -3199,7 +3210,7 @@
             <a:fld id="{B61BEF0D-F0BB-DE4B-95CE-6DB70DBA9567}" type="datetimeFigureOut">
               <a:rPr lang="en-US" dirty="0"/>
               <a:pPr/>
-              <a:t>2/9/2014</a:t>
+              <a:t>2/12/2014</a:t>
             </a:fld>
             <a:endParaRPr lang="en-US" dirty="0"/>
           </a:p>
@@ -3427,7 +3438,7 @@
           <a:p>
             <a:fld id="{EB712588-04B1-427B-82EE-E8DB90309F08}" type="datetimeFigureOut">
               <a:rPr lang="en-US" dirty="0"/>
-              <a:t>2/9/2014</a:t>
+              <a:t>2/12/2014</a:t>
             </a:fld>
             <a:endParaRPr lang="en-US" dirty="0"/>
           </a:p>
@@ -3797,7 +3808,7 @@
             <a:fld id="{B61BEF0D-F0BB-DE4B-95CE-6DB70DBA9567}" type="datetimeFigureOut">
               <a:rPr lang="en-US" dirty="0"/>
               <a:pPr/>
-              <a:t>2/9/2014</a:t>
+              <a:t>2/12/2014</a:t>
             </a:fld>
             <a:endParaRPr lang="en-US" dirty="0"/>
           </a:p>
@@ -3917,7 +3928,7 @@
             <a:fld id="{B61BEF0D-F0BB-DE4B-95CE-6DB70DBA9567}" type="datetimeFigureOut">
               <a:rPr lang="en-US" dirty="0"/>
               <a:pPr/>
-              <a:t>2/9/2014</a:t>
+              <a:t>2/12/2014</a:t>
             </a:fld>
             <a:endParaRPr lang="en-US" dirty="0"/>
           </a:p>
@@ -4009,7 +4020,7 @@
             <a:fld id="{B61BEF0D-F0BB-DE4B-95CE-6DB70DBA9567}" type="datetimeFigureOut">
               <a:rPr lang="en-US" dirty="0"/>
               <a:pPr/>
-              <a:t>2/9/2014</a:t>
+              <a:t>2/12/2014</a:t>
             </a:fld>
             <a:endParaRPr lang="en-US" dirty="0"/>
           </a:p>
@@ -4260,7 +4271,7 @@
           <a:p>
             <a:fld id="{42A54C80-263E-416B-A8E0-580EDEADCBDC}" type="datetimeFigureOut">
               <a:rPr lang="en-US" dirty="0"/>
-              <a:t>2/9/2014</a:t>
+              <a:t>2/12/2014</a:t>
             </a:fld>
             <a:endParaRPr lang="en-US" dirty="0"/>
           </a:p>
@@ -4519,7 +4530,7 @@
             <a:fld id="{B61BEF0D-F0BB-DE4B-95CE-6DB70DBA9567}" type="datetimeFigureOut">
               <a:rPr lang="en-US" dirty="0"/>
               <a:pPr/>
-              <a:t>2/9/2014</a:t>
+              <a:t>2/12/2014</a:t>
             </a:fld>
             <a:endParaRPr lang="en-US" dirty="0"/>
           </a:p>
@@ -5259,7 +5270,7 @@
             <a:fld id="{B61BEF0D-F0BB-DE4B-95CE-6DB70DBA9567}" type="datetimeFigureOut">
               <a:rPr lang="en-US" dirty="0"/>
               <a:pPr/>
-              <a:t>2/9/2014</a:t>
+              <a:t>2/12/2014</a:t>
             </a:fld>
             <a:endParaRPr lang="en-US" dirty="0"/>
           </a:p>
@@ -6245,12 +6256,12 @@
               <a:t>Using provided audio files </a:t>
             </a:r>
             <a:r>
-              <a:rPr lang="en-US" dirty="0" err="1" smtClean="0"/>
-              <a:t>assoiciated</a:t>
-            </a:r>
-            <a:r>
               <a:rPr lang="en-US" dirty="0" smtClean="0"/>
-              <a:t> with a list start the word/sentence and pause so that a technician can record a response via buttons on the screen</a:t>
+              <a:t>associated </a:t>
+            </a:r>
+            <a:r>
+              <a:rPr lang="en-US" dirty="0" smtClean="0"/>
+              <a:t>with a list start the word/sentence and pause so that a technician can record a response via buttons on the screen</a:t>
             </a:r>
           </a:p>
           <a:p>
@@ -6259,12 +6270,12 @@
               <a:t>Calculation of the final score with ability to modify before </a:t>
             </a:r>
             <a:r>
-              <a:rPr lang="en-US" dirty="0" err="1" smtClean="0"/>
-              <a:t>completetion</a:t>
-            </a:r>
-            <a:r>
               <a:rPr lang="en-US" dirty="0" smtClean="0"/>
-              <a:t> of the test</a:t>
+              <a:t>completion </a:t>
+            </a:r>
+            <a:r>
+              <a:rPr lang="en-US" dirty="0" smtClean="0"/>
+              <a:t>of the test</a:t>
             </a:r>
           </a:p>
           <a:p>
@@ -6813,10 +6824,42 @@
         </p:nvSpPr>
         <p:spPr/>
         <p:txBody>
-          <a:bodyPr/>
-          <a:lstStyle/>
-          <a:p>
-            <a:endParaRPr lang="en-US"/>
+          <a:bodyPr>
+            <a:normAutofit/>
+          </a:bodyPr>
+          <a:lstStyle/>
+          <a:p>
+            <a:r>
+              <a:rPr lang="en-US" sz="2800" dirty="0" smtClean="0"/>
+              <a:t>Individual components of the project to be 			    		completed by the first of April</a:t>
+            </a:r>
+          </a:p>
+          <a:p>
+            <a:r>
+              <a:rPr lang="en-US" sz="2800" dirty="0" smtClean="0"/>
+              <a:t>Robust testing to commence in April</a:t>
+            </a:r>
+          </a:p>
+          <a:p>
+            <a:r>
+              <a:rPr lang="en-US" sz="2800" dirty="0" smtClean="0"/>
+              <a:t>Final project requirements to be fulfilled by end 	</a:t>
+            </a:r>
+            <a:r>
+              <a:rPr lang="en-US" sz="2800" smtClean="0"/>
+              <a:t>	  	of </a:t>
+            </a:r>
+            <a:r>
+              <a:rPr lang="en-US" sz="2800" dirty="0" smtClean="0"/>
+              <a:t>May</a:t>
+            </a:r>
+          </a:p>
+          <a:p>
+            <a:r>
+              <a:rPr lang="en-US" sz="2800" dirty="0" smtClean="0"/>
+              <a:t>Presentation of software first of June</a:t>
+            </a:r>
+            <a:endParaRPr lang="en-US" sz="2800" dirty="0"/>
           </a:p>
         </p:txBody>
       </p:sp>
@@ -7251,7 +7294,7 @@
   <a:extraClrSchemeLst/>
   <a:extLst>
     <a:ext uri="{05A4C25C-085E-4340-85A3-A5531E510DB2}">
-      <thm15:themeFamily xmlns="" xmlns:thm15="http://schemas.microsoft.com/office/thememl/2012/main" name="Facet" id="{C0C680CD-088A-49FC-A102-D699147F32B2}" vid="{CFBC31BA-B70F-4F30-BCAA-4F3011E16C4D}"/>
+      <thm15:themeFamily xmlns:thm15="http://schemas.microsoft.com/office/thememl/2012/main" name="Facet" id="{C0C680CD-088A-49FC-A102-D699147F32B2}" vid="{CFBC31BA-B70F-4F30-BCAA-4F3011E16C4D}"/>
     </a:ext>
   </a:extLst>
 </a:theme>

</xml_diff>

<commit_message>
updated flow chart from Ngan
</commit_message>
<xml_diff>
--- a/TestBuilders.pptx
+++ b/TestBuilders.pptx
@@ -857,7 +857,7 @@
             <a:fld id="{B61BEF0D-F0BB-DE4B-95CE-6DB70DBA9567}" type="datetimeFigureOut">
               <a:rPr lang="en-US" dirty="0"/>
               <a:pPr/>
-              <a:t>2/12/2014</a:t>
+              <a:t>2/14/2014</a:t>
             </a:fld>
             <a:endParaRPr lang="en-US" dirty="0"/>
           </a:p>
@@ -1105,7 +1105,7 @@
             <a:fld id="{B61BEF0D-F0BB-DE4B-95CE-6DB70DBA9567}" type="datetimeFigureOut">
               <a:rPr lang="en-US" dirty="0"/>
               <a:pPr/>
-              <a:t>2/12/2014</a:t>
+              <a:t>2/14/2014</a:t>
             </a:fld>
             <a:endParaRPr lang="en-US" dirty="0"/>
           </a:p>
@@ -1416,7 +1416,7 @@
             <a:fld id="{B61BEF0D-F0BB-DE4B-95CE-6DB70DBA9567}" type="datetimeFigureOut">
               <a:rPr lang="en-US" dirty="0"/>
               <a:pPr/>
-              <a:t>2/12/2014</a:t>
+              <a:t>2/14/2014</a:t>
             </a:fld>
             <a:endParaRPr lang="en-US" dirty="0"/>
           </a:p>
@@ -1754,7 +1754,7 @@
             <a:fld id="{B61BEF0D-F0BB-DE4B-95CE-6DB70DBA9567}" type="datetimeFigureOut">
               <a:rPr lang="en-US" dirty="0"/>
               <a:pPr/>
-              <a:t>2/12/2014</a:t>
+              <a:t>2/14/2014</a:t>
             </a:fld>
             <a:endParaRPr lang="en-US" dirty="0"/>
           </a:p>
@@ -2065,7 +2065,7 @@
             <a:fld id="{B61BEF0D-F0BB-DE4B-95CE-6DB70DBA9567}" type="datetimeFigureOut">
               <a:rPr lang="en-US" dirty="0"/>
               <a:pPr/>
-              <a:t>2/12/2014</a:t>
+              <a:t>2/14/2014</a:t>
             </a:fld>
             <a:endParaRPr lang="en-US" dirty="0"/>
           </a:p>
@@ -2455,7 +2455,7 @@
             <a:fld id="{B61BEF0D-F0BB-DE4B-95CE-6DB70DBA9567}" type="datetimeFigureOut">
               <a:rPr lang="en-US" dirty="0"/>
               <a:pPr/>
-              <a:t>2/12/2014</a:t>
+              <a:t>2/14/2014</a:t>
             </a:fld>
             <a:endParaRPr lang="en-US" dirty="0"/>
           </a:p>
@@ -2621,7 +2621,7 @@
           <a:p>
             <a:fld id="{55C6B4A9-1611-4792-9094-5F34BCA07E0B}" type="datetimeFigureOut">
               <a:rPr lang="en-US" dirty="0"/>
-              <a:t>2/12/2014</a:t>
+              <a:t>2/14/2014</a:t>
             </a:fld>
             <a:endParaRPr lang="en-US" dirty="0"/>
           </a:p>
@@ -2797,7 +2797,7 @@
             <a:fld id="{B61BEF0D-F0BB-DE4B-95CE-6DB70DBA9567}" type="datetimeFigureOut">
               <a:rPr lang="en-US" dirty="0"/>
               <a:pPr/>
-              <a:t>2/12/2014</a:t>
+              <a:t>2/14/2014</a:t>
             </a:fld>
             <a:endParaRPr lang="en-US" dirty="0"/>
           </a:p>
@@ -2970,7 +2970,7 @@
             <a:fld id="{B61BEF0D-F0BB-DE4B-95CE-6DB70DBA9567}" type="datetimeFigureOut">
               <a:rPr lang="en-US" dirty="0"/>
               <a:pPr/>
-              <a:t>2/12/2014</a:t>
+              <a:t>2/14/2014</a:t>
             </a:fld>
             <a:endParaRPr lang="en-US" dirty="0"/>
           </a:p>
@@ -3214,7 +3214,7 @@
             <a:fld id="{B61BEF0D-F0BB-DE4B-95CE-6DB70DBA9567}" type="datetimeFigureOut">
               <a:rPr lang="en-US" dirty="0"/>
               <a:pPr/>
-              <a:t>2/12/2014</a:t>
+              <a:t>2/14/2014</a:t>
             </a:fld>
             <a:endParaRPr lang="en-US" dirty="0"/>
           </a:p>
@@ -3442,7 +3442,7 @@
           <a:p>
             <a:fld id="{EB712588-04B1-427B-82EE-E8DB90309F08}" type="datetimeFigureOut">
               <a:rPr lang="en-US" dirty="0"/>
-              <a:t>2/12/2014</a:t>
+              <a:t>2/14/2014</a:t>
             </a:fld>
             <a:endParaRPr lang="en-US" dirty="0"/>
           </a:p>
@@ -3812,7 +3812,7 @@
             <a:fld id="{B61BEF0D-F0BB-DE4B-95CE-6DB70DBA9567}" type="datetimeFigureOut">
               <a:rPr lang="en-US" dirty="0"/>
               <a:pPr/>
-              <a:t>2/12/2014</a:t>
+              <a:t>2/14/2014</a:t>
             </a:fld>
             <a:endParaRPr lang="en-US" dirty="0"/>
           </a:p>
@@ -3932,7 +3932,7 @@
             <a:fld id="{B61BEF0D-F0BB-DE4B-95CE-6DB70DBA9567}" type="datetimeFigureOut">
               <a:rPr lang="en-US" dirty="0"/>
               <a:pPr/>
-              <a:t>2/12/2014</a:t>
+              <a:t>2/14/2014</a:t>
             </a:fld>
             <a:endParaRPr lang="en-US" dirty="0"/>
           </a:p>
@@ -4024,7 +4024,7 @@
             <a:fld id="{B61BEF0D-F0BB-DE4B-95CE-6DB70DBA9567}" type="datetimeFigureOut">
               <a:rPr lang="en-US" dirty="0"/>
               <a:pPr/>
-              <a:t>2/12/2014</a:t>
+              <a:t>2/14/2014</a:t>
             </a:fld>
             <a:endParaRPr lang="en-US" dirty="0"/>
           </a:p>
@@ -4275,7 +4275,7 @@
           <a:p>
             <a:fld id="{42A54C80-263E-416B-A8E0-580EDEADCBDC}" type="datetimeFigureOut">
               <a:rPr lang="en-US" dirty="0"/>
-              <a:t>2/12/2014</a:t>
+              <a:t>2/14/2014</a:t>
             </a:fld>
             <a:endParaRPr lang="en-US" dirty="0"/>
           </a:p>
@@ -4534,7 +4534,7 @@
             <a:fld id="{B61BEF0D-F0BB-DE4B-95CE-6DB70DBA9567}" type="datetimeFigureOut">
               <a:rPr lang="en-US" dirty="0"/>
               <a:pPr/>
-              <a:t>2/12/2014</a:t>
+              <a:t>2/14/2014</a:t>
             </a:fld>
             <a:endParaRPr lang="en-US" dirty="0"/>
           </a:p>
@@ -5274,7 +5274,7 @@
             <a:fld id="{B61BEF0D-F0BB-DE4B-95CE-6DB70DBA9567}" type="datetimeFigureOut">
               <a:rPr lang="en-US" dirty="0"/>
               <a:pPr/>
-              <a:t>2/12/2014</a:t>
+              <a:t>2/14/2014</a:t>
             </a:fld>
             <a:endParaRPr lang="en-US" dirty="0"/>
           </a:p>
@@ -6210,7 +6210,7 @@
       </p:sp>
       <p:pic>
         <p:nvPicPr>
-          <p:cNvPr id="6" name="Picture 5"/>
+          <p:cNvPr id="2" name="Picture 1"/>
           <p:cNvPicPr>
             <a:picLocks noChangeAspect="1"/>
           </p:cNvPicPr>
@@ -6224,8 +6224,8 @@
         </p:blipFill>
         <p:spPr>
           <a:xfrm>
-            <a:off x="186177" y="215127"/>
-            <a:ext cx="12005644" cy="6366828"/>
+            <a:off x="101814" y="258792"/>
+            <a:ext cx="11972105" cy="6349042"/>
           </a:xfrm>
           <a:prstGeom prst="rect">
             <a:avLst/>
@@ -7451,9 +7451,37 @@
           <a:chExt cx="0" cy="0"/>
         </a:xfrm>
       </p:grpSpPr>
+      <p:sp>
+        <p:nvSpPr>
+          <p:cNvPr id="2" name="Title 1"/>
+          <p:cNvSpPr>
+            <a:spLocks noGrp="1"/>
+          </p:cNvSpPr>
+          <p:nvPr>
+            <p:ph type="title"/>
+          </p:nvPr>
+        </p:nvSpPr>
+        <p:spPr>
+          <a:xfrm>
+            <a:off x="186177" y="-735637"/>
+            <a:ext cx="3854528" cy="1278466"/>
+          </a:xfrm>
+        </p:spPr>
+        <p:txBody>
+          <a:bodyPr/>
+          <a:lstStyle/>
+          <a:p>
+            <a:r>
+              <a:rPr lang="en-US" dirty="0" smtClean="0"/>
+              <a:t>Flow chart</a:t>
+            </a:r>
+            <a:endParaRPr lang="en-US" dirty="0"/>
+          </a:p>
+        </p:txBody>
+      </p:sp>
       <p:pic>
         <p:nvPicPr>
-          <p:cNvPr id="7" name="Picture 6"/>
+          <p:cNvPr id="3" name="Picture 2"/>
           <p:cNvPicPr>
             <a:picLocks noChangeAspect="1"/>
           </p:cNvPicPr>
@@ -7467,42 +7495,14 @@
         </p:blipFill>
         <p:spPr>
           <a:xfrm>
-            <a:off x="186177" y="72557"/>
-            <a:ext cx="9041634" cy="6854454"/>
+            <a:off x="1610109" y="24294"/>
+            <a:ext cx="8939997" cy="6833706"/>
           </a:xfrm>
           <a:prstGeom prst="rect">
             <a:avLst/>
           </a:prstGeom>
         </p:spPr>
       </p:pic>
-      <p:sp>
-        <p:nvSpPr>
-          <p:cNvPr id="2" name="Title 1"/>
-          <p:cNvSpPr>
-            <a:spLocks noGrp="1"/>
-          </p:cNvSpPr>
-          <p:nvPr>
-            <p:ph type="title"/>
-          </p:nvPr>
-        </p:nvSpPr>
-        <p:spPr>
-          <a:xfrm>
-            <a:off x="186177" y="-735637"/>
-            <a:ext cx="3854528" cy="1278466"/>
-          </a:xfrm>
-        </p:spPr>
-        <p:txBody>
-          <a:bodyPr/>
-          <a:lstStyle/>
-          <a:p>
-            <a:r>
-              <a:rPr lang="en-US" dirty="0" smtClean="0"/>
-              <a:t>Flow chart</a:t>
-            </a:r>
-            <a:endParaRPr lang="en-US" dirty="0"/>
-          </a:p>
-        </p:txBody>
-      </p:sp>
     </p:spTree>
     <p:extLst>
       <p:ext uri="{BB962C8B-B14F-4D97-AF65-F5344CB8AC3E}">

</xml_diff>